<commit_message>
Got claim*context parameter to model confirmatory bias
</commit_message>
<xml_diff>
--- a/forensic_beads_for_bruno.pptx
+++ b/forensic_beads_for_bruno.pptx
@@ -6,10 +6,15 @@
   </p:sldMasterIdLst>
   <p:sldIdLst>
     <p:sldId id="256" r:id="rId2"/>
-    <p:sldId id="257" r:id="rId3"/>
-    <p:sldId id="260" r:id="rId4"/>
-    <p:sldId id="259" r:id="rId5"/>
-    <p:sldId id="258" r:id="rId6"/>
+    <p:sldId id="261" r:id="rId3"/>
+    <p:sldId id="257" r:id="rId4"/>
+    <p:sldId id="262" r:id="rId5"/>
+    <p:sldId id="260" r:id="rId6"/>
+    <p:sldId id="263" r:id="rId7"/>
+    <p:sldId id="259" r:id="rId8"/>
+    <p:sldId id="264" r:id="rId9"/>
+    <p:sldId id="258" r:id="rId10"/>
+    <p:sldId id="265" r:id="rId11"/>
   </p:sldIdLst>
   <p:sldSz cx="12192000" cy="6858000"/>
   <p:notesSz cx="6858000" cy="9144000"/>
@@ -108,6 +113,11 @@
       </a:defRPr>
     </a:lvl9pPr>
   </p:defaultTextStyle>
+  <p:extLst>
+    <p:ext uri="{EFAFB233-063F-42B5-8137-9DF3F51BA10A}">
+      <p15:sldGuideLst xmlns:p15="http://schemas.microsoft.com/office/powerpoint/2012/main"/>
+    </p:ext>
+  </p:extLst>
 </p:presentation>
 </file>
 
@@ -242,7 +252,7 @@
           <a:p>
             <a:fld id="{2700C6BD-C0EF-422F-A3C6-08FCE5AFE907}" type="datetimeFigureOut">
               <a:rPr lang="en-GB" smtClean="0"/>
-              <a:t>07/09/2023</a:t>
+              <a:t>09/09/2023</a:t>
             </a:fld>
             <a:endParaRPr lang="en-GB"/>
           </a:p>
@@ -412,7 +422,7 @@
           <a:p>
             <a:fld id="{2700C6BD-C0EF-422F-A3C6-08FCE5AFE907}" type="datetimeFigureOut">
               <a:rPr lang="en-GB" smtClean="0"/>
-              <a:t>07/09/2023</a:t>
+              <a:t>09/09/2023</a:t>
             </a:fld>
             <a:endParaRPr lang="en-GB"/>
           </a:p>
@@ -592,7 +602,7 @@
           <a:p>
             <a:fld id="{2700C6BD-C0EF-422F-A3C6-08FCE5AFE907}" type="datetimeFigureOut">
               <a:rPr lang="en-GB" smtClean="0"/>
-              <a:t>07/09/2023</a:t>
+              <a:t>09/09/2023</a:t>
             </a:fld>
             <a:endParaRPr lang="en-GB"/>
           </a:p>
@@ -762,7 +772,7 @@
           <a:p>
             <a:fld id="{2700C6BD-C0EF-422F-A3C6-08FCE5AFE907}" type="datetimeFigureOut">
               <a:rPr lang="en-GB" smtClean="0"/>
-              <a:t>07/09/2023</a:t>
+              <a:t>09/09/2023</a:t>
             </a:fld>
             <a:endParaRPr lang="en-GB"/>
           </a:p>
@@ -1008,7 +1018,7 @@
           <a:p>
             <a:fld id="{2700C6BD-C0EF-422F-A3C6-08FCE5AFE907}" type="datetimeFigureOut">
               <a:rPr lang="en-GB" smtClean="0"/>
-              <a:t>07/09/2023</a:t>
+              <a:t>09/09/2023</a:t>
             </a:fld>
             <a:endParaRPr lang="en-GB"/>
           </a:p>
@@ -1240,7 +1250,7 @@
           <a:p>
             <a:fld id="{2700C6BD-C0EF-422F-A3C6-08FCE5AFE907}" type="datetimeFigureOut">
               <a:rPr lang="en-GB" smtClean="0"/>
-              <a:t>07/09/2023</a:t>
+              <a:t>09/09/2023</a:t>
             </a:fld>
             <a:endParaRPr lang="en-GB"/>
           </a:p>
@@ -1607,7 +1617,7 @@
           <a:p>
             <a:fld id="{2700C6BD-C0EF-422F-A3C6-08FCE5AFE907}" type="datetimeFigureOut">
               <a:rPr lang="en-GB" smtClean="0"/>
-              <a:t>07/09/2023</a:t>
+              <a:t>09/09/2023</a:t>
             </a:fld>
             <a:endParaRPr lang="en-GB"/>
           </a:p>
@@ -1725,7 +1735,7 @@
           <a:p>
             <a:fld id="{2700C6BD-C0EF-422F-A3C6-08FCE5AFE907}" type="datetimeFigureOut">
               <a:rPr lang="en-GB" smtClean="0"/>
-              <a:t>07/09/2023</a:t>
+              <a:t>09/09/2023</a:t>
             </a:fld>
             <a:endParaRPr lang="en-GB"/>
           </a:p>
@@ -1820,7 +1830,7 @@
           <a:p>
             <a:fld id="{2700C6BD-C0EF-422F-A3C6-08FCE5AFE907}" type="datetimeFigureOut">
               <a:rPr lang="en-GB" smtClean="0"/>
-              <a:t>07/09/2023</a:t>
+              <a:t>09/09/2023</a:t>
             </a:fld>
             <a:endParaRPr lang="en-GB"/>
           </a:p>
@@ -2097,7 +2107,7 @@
           <a:p>
             <a:fld id="{2700C6BD-C0EF-422F-A3C6-08FCE5AFE907}" type="datetimeFigureOut">
               <a:rPr lang="en-GB" smtClean="0"/>
-              <a:t>07/09/2023</a:t>
+              <a:t>09/09/2023</a:t>
             </a:fld>
             <a:endParaRPr lang="en-GB"/>
           </a:p>
@@ -2350,7 +2360,7 @@
           <a:p>
             <a:fld id="{2700C6BD-C0EF-422F-A3C6-08FCE5AFE907}" type="datetimeFigureOut">
               <a:rPr lang="en-GB" smtClean="0"/>
-              <a:t>07/09/2023</a:t>
+              <a:t>09/09/2023</a:t>
             </a:fld>
             <a:endParaRPr lang="en-GB"/>
           </a:p>
@@ -2563,7 +2573,7 @@
           <a:p>
             <a:fld id="{2700C6BD-C0EF-422F-A3C6-08FCE5AFE907}" type="datetimeFigureOut">
               <a:rPr lang="en-GB" smtClean="0"/>
-              <a:t>07/09/2023</a:t>
+              <a:t>09/09/2023</a:t>
             </a:fld>
             <a:endParaRPr lang="en-GB"/>
           </a:p>
@@ -3087,7 +3097,7 @@
 </p:sld>
 </file>
 
-<file path=ppt/slides/slide2.xml><?xml version="1.0" encoding="utf-8"?>
+<file path=ppt/slides/slide10.xml><?xml version="1.0" encoding="utf-8"?>
 <p:sld xmlns:a="http://schemas.openxmlformats.org/drawingml/2006/main" xmlns:r="http://schemas.openxmlformats.org/officeDocument/2006/relationships" xmlns:p="http://schemas.openxmlformats.org/presentationml/2006/main">
   <p:cSld>
     <p:spTree>
@@ -3113,123 +3123,89 @@
           <p:nvPr/>
         </p:nvPicPr>
         <p:blipFill rotWithShape="1">
-          <a:blip r:embed="rId2"/>
-          <a:srcRect l="24583" t="14074" r="42813" b="38888"/>
+          <a:blip r:embed="rId2">
+            <a:extLst>
+              <a:ext uri="{28A0092B-C50C-407E-A947-70E740481C1C}">
+                <a14:useLocalDpi xmlns:a14="http://schemas.microsoft.com/office/drawing/2010/main" val="0"/>
+              </a:ext>
+            </a:extLst>
+          </a:blip>
+          <a:srcRect t="10666" b="7777"/>
           <a:stretch/>
         </p:blipFill>
         <p:spPr>
           <a:xfrm>
-            <a:off x="190500" y="1219200"/>
-            <a:ext cx="5962650" cy="4838700"/>
+            <a:off x="0" y="731520"/>
+            <a:ext cx="12192000" cy="5593080"/>
           </a:xfrm>
           <a:prstGeom prst="rect">
             <a:avLst/>
           </a:prstGeom>
         </p:spPr>
       </p:pic>
-      <p:sp>
-        <p:nvSpPr>
-          <p:cNvPr id="5" name="TextBox 4"/>
-          <p:cNvSpPr txBox="1"/>
-          <p:nvPr/>
-        </p:nvSpPr>
-        <p:spPr>
-          <a:xfrm>
-            <a:off x="834972" y="567035"/>
-            <a:ext cx="5077168" cy="646331"/>
-          </a:xfrm>
-          <a:prstGeom prst="rect">
-            <a:avLst/>
-          </a:prstGeom>
-          <a:noFill/>
-        </p:spPr>
-        <p:txBody>
-          <a:bodyPr wrap="square" rtlCol="0">
-            <a:spAutoFit/>
-          </a:bodyPr>
-          <a:lstStyle/>
-          <a:p>
-            <a:pPr algn="ctr"/>
-            <a:r>
-              <a:rPr lang="en-GB" dirty="0" smtClean="0"/>
-              <a:t>Study 1</a:t>
-            </a:r>
-          </a:p>
-          <a:p>
-            <a:pPr algn="ctr"/>
-            <a:r>
-              <a:rPr lang="en-GB" dirty="0" smtClean="0"/>
-              <a:t>Blue and orange bars are Suspect conditions)</a:t>
-            </a:r>
-            <a:endParaRPr lang="en-GB" dirty="0"/>
-          </a:p>
-        </p:txBody>
-      </p:sp>
+    </p:spTree>
+    <p:extLst>
+      <p:ext uri="{BB962C8B-B14F-4D97-AF65-F5344CB8AC3E}">
+        <p14:creationId xmlns:p14="http://schemas.microsoft.com/office/powerpoint/2010/main" val="1174547242"/>
+      </p:ext>
+    </p:extLst>
+  </p:cSld>
+  <p:clrMapOvr>
+    <a:masterClrMapping/>
+  </p:clrMapOvr>
+</p:sld>
+</file>
+
+<file path=ppt/slides/slide2.xml><?xml version="1.0" encoding="utf-8"?>
+<p:sld xmlns:a="http://schemas.openxmlformats.org/drawingml/2006/main" xmlns:r="http://schemas.openxmlformats.org/officeDocument/2006/relationships" xmlns:p="http://schemas.openxmlformats.org/presentationml/2006/main">
+  <p:cSld>
+    <p:spTree>
+      <p:nvGrpSpPr>
+        <p:cNvPr id="1" name=""/>
+        <p:cNvGrpSpPr/>
+        <p:nvPr/>
+      </p:nvGrpSpPr>
+      <p:grpSpPr>
+        <a:xfrm>
+          <a:off x="0" y="0"/>
+          <a:ext cx="0" cy="0"/>
+          <a:chOff x="0" y="0"/>
+          <a:chExt cx="0" cy="0"/>
+        </a:xfrm>
+      </p:grpSpPr>
       <p:pic>
         <p:nvPicPr>
-          <p:cNvPr id="6" name="Picture 5"/>
+          <p:cNvPr id="5" name="Picture 4"/>
           <p:cNvPicPr>
             <a:picLocks noChangeAspect="1"/>
           </p:cNvPicPr>
           <p:nvPr/>
         </p:nvPicPr>
         <p:blipFill rotWithShape="1">
-          <a:blip r:embed="rId3"/>
-          <a:srcRect l="4792" t="14629" r="62708" b="38148"/>
+          <a:blip r:embed="rId2">
+            <a:extLst>
+              <a:ext uri="{28A0092B-C50C-407E-A947-70E740481C1C}">
+                <a14:useLocalDpi xmlns:a14="http://schemas.microsoft.com/office/drawing/2010/main" val="0"/>
+              </a:ext>
+            </a:extLst>
+          </a:blip>
+          <a:srcRect l="1913" t="9275" r="3826" b="14976"/>
           <a:stretch/>
         </p:blipFill>
         <p:spPr>
           <a:xfrm>
-            <a:off x="6153150" y="1219200"/>
-            <a:ext cx="5943600" cy="4857750"/>
+            <a:off x="1950720" y="1600200"/>
+            <a:ext cx="8260080" cy="3733800"/>
           </a:xfrm>
           <a:prstGeom prst="rect">
             <a:avLst/>
           </a:prstGeom>
         </p:spPr>
       </p:pic>
-      <p:sp>
-        <p:nvSpPr>
-          <p:cNvPr id="7" name="TextBox 6"/>
-          <p:cNvSpPr txBox="1"/>
-          <p:nvPr/>
-        </p:nvSpPr>
-        <p:spPr>
-          <a:xfrm>
-            <a:off x="7270459" y="567034"/>
-            <a:ext cx="4329647" cy="646331"/>
-          </a:xfrm>
-          <a:prstGeom prst="rect">
-            <a:avLst/>
-          </a:prstGeom>
-          <a:noFill/>
-        </p:spPr>
-        <p:txBody>
-          <a:bodyPr wrap="none" rtlCol="0">
-            <a:spAutoFit/>
-          </a:bodyPr>
-          <a:lstStyle/>
-          <a:p>
-            <a:pPr algn="ctr"/>
-            <a:r>
-              <a:rPr lang="en-GB" dirty="0" smtClean="0"/>
-              <a:t>Study 2</a:t>
-            </a:r>
-          </a:p>
-          <a:p>
-            <a:pPr algn="ctr"/>
-            <a:r>
-              <a:rPr lang="en-GB" dirty="0" smtClean="0"/>
-              <a:t>First two parameters are suspect conditions </a:t>
-            </a:r>
-            <a:endParaRPr lang="en-GB" dirty="0"/>
-          </a:p>
-        </p:txBody>
-      </p:sp>
     </p:spTree>
     <p:extLst>
       <p:ext uri="{BB962C8B-B14F-4D97-AF65-F5344CB8AC3E}">
-        <p14:creationId xmlns:p14="http://schemas.microsoft.com/office/powerpoint/2010/main" val="1889650088"/>
+        <p14:creationId xmlns:p14="http://schemas.microsoft.com/office/powerpoint/2010/main" val="1773595012"/>
       </p:ext>
     </p:extLst>
   </p:cSld>
@@ -3266,13 +3242,13 @@
         </p:nvPicPr>
         <p:blipFill rotWithShape="1">
           <a:blip r:embed="rId2"/>
-          <a:srcRect l="25521" t="13519" r="4167" b="40000"/>
+          <a:srcRect l="24583" t="14074" r="42813" b="38888"/>
           <a:stretch/>
         </p:blipFill>
         <p:spPr>
           <a:xfrm>
-            <a:off x="0" y="1028700"/>
-            <a:ext cx="12192000" cy="4533618"/>
+            <a:off x="190500" y="1219200"/>
+            <a:ext cx="5962650" cy="4838700"/>
           </a:xfrm>
           <a:prstGeom prst="rect">
             <a:avLst/>
@@ -3287,8 +3263,8 @@
         </p:nvSpPr>
         <p:spPr>
           <a:xfrm>
-            <a:off x="8787135" y="304800"/>
-            <a:ext cx="885179" cy="646331"/>
+            <a:off x="834972" y="567035"/>
+            <a:ext cx="5077168" cy="646331"/>
           </a:xfrm>
           <a:prstGeom prst="rect">
             <a:avLst/>
@@ -3296,31 +3272,60 @@
           <a:noFill/>
         </p:spPr>
         <p:txBody>
-          <a:bodyPr wrap="none" rtlCol="0">
+          <a:bodyPr wrap="square" rtlCol="0">
             <a:spAutoFit/>
           </a:bodyPr>
           <a:lstStyle/>
           <a:p>
+            <a:pPr algn="ctr"/>
             <a:r>
               <a:rPr lang="en-GB" dirty="0" smtClean="0"/>
-              <a:t>Study 2</a:t>
-            </a:r>
-          </a:p>
-          <a:p>
+              <a:t>Study 1</a:t>
+            </a:r>
+          </a:p>
+          <a:p>
+            <a:pPr algn="ctr"/>
+            <a:r>
+              <a:rPr lang="en-GB" dirty="0" smtClean="0"/>
+              <a:t>Blue and orange bars are Suspect conditions)</a:t>
+            </a:r>
             <a:endParaRPr lang="en-GB" dirty="0"/>
           </a:p>
         </p:txBody>
       </p:sp>
-      <p:sp>
-        <p:nvSpPr>
-          <p:cNvPr id="6" name="TextBox 5"/>
+      <p:pic>
+        <p:nvPicPr>
+          <p:cNvPr id="6" name="Picture 5"/>
+          <p:cNvPicPr>
+            <a:picLocks noChangeAspect="1"/>
+          </p:cNvPicPr>
+          <p:nvPr/>
+        </p:nvPicPr>
+        <p:blipFill rotWithShape="1">
+          <a:blip r:embed="rId3"/>
+          <a:srcRect l="4792" t="14629" r="62708" b="38148"/>
+          <a:stretch/>
+        </p:blipFill>
+        <p:spPr>
+          <a:xfrm>
+            <a:off x="6153150" y="1219200"/>
+            <a:ext cx="5943600" cy="4857750"/>
+          </a:xfrm>
+          <a:prstGeom prst="rect">
+            <a:avLst/>
+          </a:prstGeom>
+        </p:spPr>
+      </p:pic>
+      <p:sp>
+        <p:nvSpPr>
+          <p:cNvPr id="7" name="TextBox 6"/>
           <p:cNvSpPr txBox="1"/>
           <p:nvPr/>
         </p:nvSpPr>
         <p:spPr>
           <a:xfrm>
-            <a:off x="2805435" y="342900"/>
-            <a:ext cx="885179" cy="646331"/>
+            <a:off x="7270459" y="567034"/>
+            <a:ext cx="4329647" cy="646331"/>
           </a:xfrm>
           <a:prstGeom prst="rect">
             <a:avLst/>
@@ -3333,12 +3338,18 @@
           </a:bodyPr>
           <a:lstStyle/>
           <a:p>
+            <a:pPr algn="ctr"/>
             <a:r>
               <a:rPr lang="en-GB" dirty="0" smtClean="0"/>
-              <a:t>Study 1</a:t>
-            </a:r>
-          </a:p>
-          <a:p>
+              <a:t>Study 2</a:t>
+            </a:r>
+          </a:p>
+          <a:p>
+            <a:pPr algn="ctr"/>
+            <a:r>
+              <a:rPr lang="en-GB" dirty="0" smtClean="0"/>
+              <a:t>First two parameters are suspect conditions </a:t>
+            </a:r>
             <a:endParaRPr lang="en-GB" dirty="0"/>
           </a:p>
         </p:txBody>
@@ -3346,7 +3357,7 @@
     </p:spTree>
     <p:extLst>
       <p:ext uri="{BB962C8B-B14F-4D97-AF65-F5344CB8AC3E}">
-        <p14:creationId xmlns:p14="http://schemas.microsoft.com/office/powerpoint/2010/main" val="1969681621"/>
+        <p14:creationId xmlns:p14="http://schemas.microsoft.com/office/powerpoint/2010/main" val="1889650088"/>
       </p:ext>
     </p:extLst>
   </p:cSld>
@@ -3382,6 +3393,241 @@
           <p:nvPr/>
         </p:nvPicPr>
         <p:blipFill rotWithShape="1">
+          <a:blip r:embed="rId2">
+            <a:extLst>
+              <a:ext uri="{28A0092B-C50C-407E-A947-70E740481C1C}">
+                <a14:useLocalDpi xmlns:a14="http://schemas.microsoft.com/office/drawing/2010/main" val="0"/>
+              </a:ext>
+            </a:extLst>
+          </a:blip>
+          <a:srcRect l="2125" t="8667" r="3875" b="10000"/>
+          <a:stretch/>
+        </p:blipFill>
+        <p:spPr>
+          <a:xfrm>
+            <a:off x="152400" y="579120"/>
+            <a:ext cx="11871960" cy="5778108"/>
+          </a:xfrm>
+          <a:prstGeom prst="rect">
+            <a:avLst/>
+          </a:prstGeom>
+        </p:spPr>
+      </p:pic>
+    </p:spTree>
+    <p:extLst>
+      <p:ext uri="{BB962C8B-B14F-4D97-AF65-F5344CB8AC3E}">
+        <p14:creationId xmlns:p14="http://schemas.microsoft.com/office/powerpoint/2010/main" val="1281668591"/>
+      </p:ext>
+    </p:extLst>
+  </p:cSld>
+  <p:clrMapOvr>
+    <a:masterClrMapping/>
+  </p:clrMapOvr>
+</p:sld>
+</file>
+
+<file path=ppt/slides/slide5.xml><?xml version="1.0" encoding="utf-8"?>
+<p:sld xmlns:a="http://schemas.openxmlformats.org/drawingml/2006/main" xmlns:r="http://schemas.openxmlformats.org/officeDocument/2006/relationships" xmlns:p="http://schemas.openxmlformats.org/presentationml/2006/main">
+  <p:cSld>
+    <p:spTree>
+      <p:nvGrpSpPr>
+        <p:cNvPr id="1" name=""/>
+        <p:cNvGrpSpPr/>
+        <p:nvPr/>
+      </p:nvGrpSpPr>
+      <p:grpSpPr>
+        <a:xfrm>
+          <a:off x="0" y="0"/>
+          <a:ext cx="0" cy="0"/>
+          <a:chOff x="0" y="0"/>
+          <a:chExt cx="0" cy="0"/>
+        </a:xfrm>
+      </p:grpSpPr>
+      <p:pic>
+        <p:nvPicPr>
+          <p:cNvPr id="4" name="Picture 3"/>
+          <p:cNvPicPr>
+            <a:picLocks noChangeAspect="1"/>
+          </p:cNvPicPr>
+          <p:nvPr/>
+        </p:nvPicPr>
+        <p:blipFill rotWithShape="1">
+          <a:blip r:embed="rId2"/>
+          <a:srcRect l="25521" t="13519" r="4167" b="40000"/>
+          <a:stretch/>
+        </p:blipFill>
+        <p:spPr>
+          <a:xfrm>
+            <a:off x="0" y="1028700"/>
+            <a:ext cx="12192000" cy="4533618"/>
+          </a:xfrm>
+          <a:prstGeom prst="rect">
+            <a:avLst/>
+          </a:prstGeom>
+        </p:spPr>
+      </p:pic>
+      <p:sp>
+        <p:nvSpPr>
+          <p:cNvPr id="5" name="TextBox 4"/>
+          <p:cNvSpPr txBox="1"/>
+          <p:nvPr/>
+        </p:nvSpPr>
+        <p:spPr>
+          <a:xfrm>
+            <a:off x="8787135" y="304800"/>
+            <a:ext cx="885179" cy="646331"/>
+          </a:xfrm>
+          <a:prstGeom prst="rect">
+            <a:avLst/>
+          </a:prstGeom>
+          <a:noFill/>
+        </p:spPr>
+        <p:txBody>
+          <a:bodyPr wrap="none" rtlCol="0">
+            <a:spAutoFit/>
+          </a:bodyPr>
+          <a:lstStyle/>
+          <a:p>
+            <a:r>
+              <a:rPr lang="en-GB" dirty="0" smtClean="0"/>
+              <a:t>Study 2</a:t>
+            </a:r>
+          </a:p>
+          <a:p>
+            <a:endParaRPr lang="en-GB" dirty="0"/>
+          </a:p>
+        </p:txBody>
+      </p:sp>
+      <p:sp>
+        <p:nvSpPr>
+          <p:cNvPr id="6" name="TextBox 5"/>
+          <p:cNvSpPr txBox="1"/>
+          <p:nvPr/>
+        </p:nvSpPr>
+        <p:spPr>
+          <a:xfrm>
+            <a:off x="2805435" y="342900"/>
+            <a:ext cx="885179" cy="646331"/>
+          </a:xfrm>
+          <a:prstGeom prst="rect">
+            <a:avLst/>
+          </a:prstGeom>
+          <a:noFill/>
+        </p:spPr>
+        <p:txBody>
+          <a:bodyPr wrap="none" rtlCol="0">
+            <a:spAutoFit/>
+          </a:bodyPr>
+          <a:lstStyle/>
+          <a:p>
+            <a:r>
+              <a:rPr lang="en-GB" dirty="0" smtClean="0"/>
+              <a:t>Study 1</a:t>
+            </a:r>
+          </a:p>
+          <a:p>
+            <a:endParaRPr lang="en-GB" dirty="0"/>
+          </a:p>
+        </p:txBody>
+      </p:sp>
+    </p:spTree>
+    <p:extLst>
+      <p:ext uri="{BB962C8B-B14F-4D97-AF65-F5344CB8AC3E}">
+        <p14:creationId xmlns:p14="http://schemas.microsoft.com/office/powerpoint/2010/main" val="1969681621"/>
+      </p:ext>
+    </p:extLst>
+  </p:cSld>
+  <p:clrMapOvr>
+    <a:masterClrMapping/>
+  </p:clrMapOvr>
+</p:sld>
+</file>
+
+<file path=ppt/slides/slide6.xml><?xml version="1.0" encoding="utf-8"?>
+<p:sld xmlns:a="http://schemas.openxmlformats.org/drawingml/2006/main" xmlns:r="http://schemas.openxmlformats.org/officeDocument/2006/relationships" xmlns:p="http://schemas.openxmlformats.org/presentationml/2006/main">
+  <p:cSld>
+    <p:spTree>
+      <p:nvGrpSpPr>
+        <p:cNvPr id="1" name=""/>
+        <p:cNvGrpSpPr/>
+        <p:nvPr/>
+      </p:nvGrpSpPr>
+      <p:grpSpPr>
+        <a:xfrm>
+          <a:off x="0" y="0"/>
+          <a:ext cx="0" cy="0"/>
+          <a:chOff x="0" y="0"/>
+          <a:chExt cx="0" cy="0"/>
+        </a:xfrm>
+      </p:grpSpPr>
+      <p:pic>
+        <p:nvPicPr>
+          <p:cNvPr id="4" name="Picture 3"/>
+          <p:cNvPicPr>
+            <a:picLocks noChangeAspect="1"/>
+          </p:cNvPicPr>
+          <p:nvPr/>
+        </p:nvPicPr>
+        <p:blipFill rotWithShape="1">
+          <a:blip r:embed="rId2">
+            <a:extLst>
+              <a:ext uri="{28A0092B-C50C-407E-A947-70E740481C1C}">
+                <a14:useLocalDpi xmlns:a14="http://schemas.microsoft.com/office/drawing/2010/main" val="0"/>
+              </a:ext>
+            </a:extLst>
+          </a:blip>
+          <a:srcRect t="4889" b="18667"/>
+          <a:stretch/>
+        </p:blipFill>
+        <p:spPr>
+          <a:xfrm>
+            <a:off x="0" y="335280"/>
+            <a:ext cx="12192000" cy="5242560"/>
+          </a:xfrm>
+          <a:prstGeom prst="rect">
+            <a:avLst/>
+          </a:prstGeom>
+        </p:spPr>
+      </p:pic>
+    </p:spTree>
+    <p:extLst>
+      <p:ext uri="{BB962C8B-B14F-4D97-AF65-F5344CB8AC3E}">
+        <p14:creationId xmlns:p14="http://schemas.microsoft.com/office/powerpoint/2010/main" val="187600193"/>
+      </p:ext>
+    </p:extLst>
+  </p:cSld>
+  <p:clrMapOvr>
+    <a:masterClrMapping/>
+  </p:clrMapOvr>
+</p:sld>
+</file>
+
+<file path=ppt/slides/slide7.xml><?xml version="1.0" encoding="utf-8"?>
+<p:sld xmlns:a="http://schemas.openxmlformats.org/drawingml/2006/main" xmlns:r="http://schemas.openxmlformats.org/officeDocument/2006/relationships" xmlns:p="http://schemas.openxmlformats.org/presentationml/2006/main">
+  <p:cSld>
+    <p:spTree>
+      <p:nvGrpSpPr>
+        <p:cNvPr id="1" name=""/>
+        <p:cNvGrpSpPr/>
+        <p:nvPr/>
+      </p:nvGrpSpPr>
+      <p:grpSpPr>
+        <a:xfrm>
+          <a:off x="0" y="0"/>
+          <a:ext cx="0" cy="0"/>
+          <a:chOff x="0" y="0"/>
+          <a:chExt cx="0" cy="0"/>
+        </a:xfrm>
+      </p:grpSpPr>
+      <p:pic>
+        <p:nvPicPr>
+          <p:cNvPr id="4" name="Picture 3"/>
+          <p:cNvPicPr>
+            <a:picLocks noChangeAspect="1"/>
+          </p:cNvPicPr>
+          <p:nvPr/>
+        </p:nvPicPr>
+        <p:blipFill rotWithShape="1">
           <a:blip r:embed="rId2"/>
           <a:srcRect l="30313" t="36852" r="51771" b="39444"/>
           <a:stretch/>
@@ -3496,7 +3742,66 @@
 </p:sld>
 </file>
 
-<file path=ppt/slides/slide5.xml><?xml version="1.0" encoding="utf-8"?>
+<file path=ppt/slides/slide8.xml><?xml version="1.0" encoding="utf-8"?>
+<p:sld xmlns:a="http://schemas.openxmlformats.org/drawingml/2006/main" xmlns:r="http://schemas.openxmlformats.org/officeDocument/2006/relationships" xmlns:p="http://schemas.openxmlformats.org/presentationml/2006/main">
+  <p:cSld>
+    <p:spTree>
+      <p:nvGrpSpPr>
+        <p:cNvPr id="1" name=""/>
+        <p:cNvGrpSpPr/>
+        <p:nvPr/>
+      </p:nvGrpSpPr>
+      <p:grpSpPr>
+        <a:xfrm>
+          <a:off x="0" y="0"/>
+          <a:ext cx="0" cy="0"/>
+          <a:chOff x="0" y="0"/>
+          <a:chExt cx="0" cy="0"/>
+        </a:xfrm>
+      </p:grpSpPr>
+      <p:pic>
+        <p:nvPicPr>
+          <p:cNvPr id="4" name="Picture 3"/>
+          <p:cNvPicPr>
+            <a:picLocks noChangeAspect="1"/>
+          </p:cNvPicPr>
+          <p:nvPr/>
+        </p:nvPicPr>
+        <p:blipFill rotWithShape="1">
+          <a:blip r:embed="rId2">
+            <a:extLst>
+              <a:ext uri="{28A0092B-C50C-407E-A947-70E740481C1C}">
+                <a14:useLocalDpi xmlns:a14="http://schemas.microsoft.com/office/drawing/2010/main" val="0"/>
+              </a:ext>
+            </a:extLst>
+          </a:blip>
+          <a:srcRect l="2000" t="3777" r="2251" b="21111"/>
+          <a:stretch/>
+        </p:blipFill>
+        <p:spPr>
+          <a:xfrm>
+            <a:off x="243840" y="259080"/>
+            <a:ext cx="11673840" cy="5151120"/>
+          </a:xfrm>
+          <a:prstGeom prst="rect">
+            <a:avLst/>
+          </a:prstGeom>
+        </p:spPr>
+      </p:pic>
+    </p:spTree>
+    <p:extLst>
+      <p:ext uri="{BB962C8B-B14F-4D97-AF65-F5344CB8AC3E}">
+        <p14:creationId xmlns:p14="http://schemas.microsoft.com/office/powerpoint/2010/main" val="3832864291"/>
+      </p:ext>
+    </p:extLst>
+  </p:cSld>
+  <p:clrMapOvr>
+    <a:masterClrMapping/>
+  </p:clrMapOvr>
+</p:sld>
+</file>
+
+<file path=ppt/slides/slide9.xml><?xml version="1.0" encoding="utf-8"?>
 <p:sld xmlns:a="http://schemas.openxmlformats.org/drawingml/2006/main" xmlns:r="http://schemas.openxmlformats.org/officeDocument/2006/relationships" xmlns:p="http://schemas.openxmlformats.org/presentationml/2006/main">
   <p:cSld>
     <p:spTree>

</xml_diff>